<commit_message>
CISC 870 Presentation work
</commit_message>
<xml_diff>
--- a/ImNO2017/Poster/ChurchSpinalVisualization_v08.pptx
+++ b/ImNO2017/Poster/ChurchSpinalVisualization_v08.pptx
@@ -4361,8 +4361,8 @@
         </p:nvSpPr>
         <p:spPr bwMode="auto">
           <a:xfrm>
-            <a:off x="856066" y="19216102"/>
-            <a:ext cx="8972959" cy="16976483"/>
+            <a:off x="761431" y="19078113"/>
+            <a:ext cx="8686800" cy="16976483"/>
           </a:xfrm>
           <a:prstGeom prst="rect">
             <a:avLst/>
@@ -4390,19 +4390,19 @@
               <a:defRPr/>
             </a:pPr>
             <a:r>
-              <a:rPr lang="en-US" sz="3600"/>
+              <a:rPr lang="en-US" sz="3600" dirty="0"/>
               <a:t>A </a:t>
             </a:r>
             <a:r>
-              <a:rPr lang="en-US" sz="3600" smtClean="0"/>
+              <a:rPr lang="en-US" sz="3600" dirty="0" smtClean="0"/>
               <a:t>healthy </a:t>
             </a:r>
             <a:r>
-              <a:rPr lang="en-US" sz="3600"/>
+              <a:rPr lang="en-US" sz="3600" dirty="0"/>
               <a:t>spine </a:t>
             </a:r>
             <a:r>
-              <a:rPr lang="en-US" sz="3600" smtClean="0"/>
+              <a:rPr lang="en-US" sz="3600" dirty="0" smtClean="0"/>
               <a:t>model </a:t>
             </a:r>
             <a:r>
@@ -5173,7 +5173,7 @@
         <p:spPr bwMode="auto">
           <a:xfrm>
             <a:off x="16982504" y="35706532"/>
-            <a:ext cx="15578302" cy="1368152"/>
+            <a:ext cx="15572232" cy="1368152"/>
           </a:xfrm>
           <a:prstGeom prst="rect">
             <a:avLst/>
@@ -5331,8 +5331,8 @@
           </p:nvSpPr>
           <p:spPr bwMode="auto">
             <a:xfrm>
-              <a:off x="785752" y="5029199"/>
-              <a:ext cx="8667567" cy="9345215"/>
+              <a:off x="785751" y="5029199"/>
+              <a:ext cx="8686800" cy="9345215"/>
             </a:xfrm>
             <a:prstGeom prst="rect">
               <a:avLst/>
@@ -5568,21 +5568,21 @@
                 <a:gridCol w="2394798">
                   <a:extLst>
                     <a:ext uri="{9D8B030D-6E8A-4147-A177-3AD203B41FA5}">
-                      <a16:colId xmlns="" xmlns:a16="http://schemas.microsoft.com/office/drawing/2014/main" val="20000"/>
+                      <a16:colId xmlns:a16="http://schemas.microsoft.com/office/drawing/2014/main" xmlns="" val="20000"/>
                     </a:ext>
                   </a:extLst>
                 </a:gridCol>
                 <a:gridCol w="2653006">
                   <a:extLst>
                     <a:ext uri="{9D8B030D-6E8A-4147-A177-3AD203B41FA5}">
-                      <a16:colId xmlns="" xmlns:a16="http://schemas.microsoft.com/office/drawing/2014/main" val="20001"/>
+                      <a16:colId xmlns:a16="http://schemas.microsoft.com/office/drawing/2014/main" xmlns="" val="20001"/>
                     </a:ext>
                   </a:extLst>
                 </a:gridCol>
                 <a:gridCol w="2662250">
                   <a:extLst>
                     <a:ext uri="{9D8B030D-6E8A-4147-A177-3AD203B41FA5}">
-                      <a16:colId xmlns="" xmlns:a16="http://schemas.microsoft.com/office/drawing/2014/main" val="20002"/>
+                      <a16:colId xmlns:a16="http://schemas.microsoft.com/office/drawing/2014/main" xmlns="" val="20002"/>
                     </a:ext>
                   </a:extLst>
                 </a:gridCol>
@@ -5811,7 +5811,7 @@
                 </a:tc>
                 <a:extLst>
                   <a:ext uri="{0D108BD9-81ED-4DB2-BD59-A6C34878D82A}">
-                    <a16:rowId xmlns="" xmlns:a16="http://schemas.microsoft.com/office/drawing/2014/main" val="10000"/>
+                    <a16:rowId xmlns:a16="http://schemas.microsoft.com/office/drawing/2014/main" xmlns="" val="10000"/>
                   </a:ext>
                 </a:extLst>
               </a:tr>
@@ -6007,7 +6007,7 @@
                 </a:tc>
                 <a:extLst>
                   <a:ext uri="{0D108BD9-81ED-4DB2-BD59-A6C34878D82A}">
-                    <a16:rowId xmlns="" xmlns:a16="http://schemas.microsoft.com/office/drawing/2014/main" val="10001"/>
+                    <a16:rowId xmlns:a16="http://schemas.microsoft.com/office/drawing/2014/main" xmlns="" val="10001"/>
                   </a:ext>
                 </a:extLst>
               </a:tr>
@@ -6203,7 +6203,7 @@
                 </a:tc>
                 <a:extLst>
                   <a:ext uri="{0D108BD9-81ED-4DB2-BD59-A6C34878D82A}">
-                    <a16:rowId xmlns="" xmlns:a16="http://schemas.microsoft.com/office/drawing/2014/main" val="10002"/>
+                    <a16:rowId xmlns:a16="http://schemas.microsoft.com/office/drawing/2014/main" xmlns="" val="10002"/>
                   </a:ext>
                 </a:extLst>
               </a:tr>
@@ -6399,7 +6399,7 @@
                 </a:tc>
                 <a:extLst>
                   <a:ext uri="{0D108BD9-81ED-4DB2-BD59-A6C34878D82A}">
-                    <a16:rowId xmlns="" xmlns:a16="http://schemas.microsoft.com/office/drawing/2014/main" val="10003"/>
+                    <a16:rowId xmlns:a16="http://schemas.microsoft.com/office/drawing/2014/main" xmlns="" val="10003"/>
                   </a:ext>
                 </a:extLst>
               </a:tr>
@@ -6595,7 +6595,7 @@
                 </a:tc>
                 <a:extLst>
                   <a:ext uri="{0D108BD9-81ED-4DB2-BD59-A6C34878D82A}">
-                    <a16:rowId xmlns="" xmlns:a16="http://schemas.microsoft.com/office/drawing/2014/main" val="10004"/>
+                    <a16:rowId xmlns:a16="http://schemas.microsoft.com/office/drawing/2014/main" xmlns="" val="10004"/>
                   </a:ext>
                 </a:extLst>
               </a:tr>
@@ -6791,7 +6791,7 @@
                 </a:tc>
                 <a:extLst>
                   <a:ext uri="{0D108BD9-81ED-4DB2-BD59-A6C34878D82A}">
-                    <a16:rowId xmlns="" xmlns:a16="http://schemas.microsoft.com/office/drawing/2014/main" val="10005"/>
+                    <a16:rowId xmlns:a16="http://schemas.microsoft.com/office/drawing/2014/main" xmlns="" val="10005"/>
                   </a:ext>
                 </a:extLst>
               </a:tr>

</xml_diff>

<commit_message>
ImNO2017 Poster - created pdf and sent to authors
</commit_message>
<xml_diff>
--- a/ImNO2017/Poster/ChurchSpinalVisualization_v08.pptx
+++ b/ImNO2017/Poster/ChurchSpinalVisualization_v08.pptx
@@ -2797,6 +2797,13 @@
   <p:clrMapOvr>
     <a:masterClrMapping/>
   </p:clrMapOvr>
+  <p:timing>
+    <p:tnLst>
+      <p:par>
+        <p:cTn id="1" dur="indefinite" restart="never" nodeType="tmRoot"/>
+      </p:par>
+    </p:tnLst>
+  </p:timing>
 </p:sldLayout>
 </file>
 
@@ -3677,6 +3684,13 @@
     <p:sldLayoutId id="2147483658" r:id="rId10"/>
     <p:sldLayoutId id="2147483659" r:id="rId11"/>
   </p:sldLayoutIdLst>
+  <p:timing>
+    <p:tnLst>
+      <p:par>
+        <p:cTn id="1" dur="indefinite" restart="never" nodeType="tmRoot"/>
+      </p:par>
+    </p:tnLst>
+  </p:timing>
   <p:txStyles>
     <p:titleStyle>
       <a:lvl1pPr algn="ctr" defTabSz="4608817" rtl="0" eaLnBrk="0" fontAlgn="base" hangingPunct="0">
@@ -4297,7 +4311,7 @@
         <p:spPr bwMode="auto">
           <a:xfrm>
             <a:off x="364535" y="18052026"/>
-            <a:ext cx="15928521" cy="19028658"/>
+            <a:ext cx="15928521" cy="19022658"/>
           </a:xfrm>
           <a:prstGeom prst="rect">
             <a:avLst/>
@@ -4341,8 +4355,8 @@
         </p:nvSpPr>
         <p:spPr bwMode="auto">
           <a:xfrm>
-            <a:off x="689448" y="19025419"/>
-            <a:ext cx="15603608" cy="18049265"/>
+            <a:off x="689448" y="18993161"/>
+            <a:ext cx="15603608" cy="18084284"/>
           </a:xfrm>
           <a:prstGeom prst="rect">
             <a:avLst/>
@@ -4559,11 +4573,7 @@
             </a:r>
             <a:r>
               <a:rPr lang="en-CA" sz="3600" dirty="0" smtClean="0"/>
-              <a:t>model to patient</a:t>
-            </a:r>
-            <a:r>
-              <a:rPr lang="en-CA" sz="3600" dirty="0" smtClean="0"/>
-              <a:t>.</a:t>
+              <a:t>model to patient.</a:t>
             </a:r>
           </a:p>
           <a:p>
@@ -4668,11 +4678,7 @@
             </a:pPr>
             <a:r>
               <a:rPr lang="en-US" sz="3600" dirty="0" smtClean="0"/>
-              <a:t>For </a:t>
-            </a:r>
-            <a:r>
-              <a:rPr lang="en-US" sz="3600" dirty="0" smtClean="0"/>
-              <a:t>ground-truth, 5 </a:t>
+              <a:t>For ground-truth, 5 </a:t>
             </a:r>
             <a:r>
               <a:rPr lang="en-US" sz="3600" dirty="0"/>
@@ -4694,11 +4700,7 @@
             </a:pPr>
             <a:r>
               <a:rPr lang="en-US" sz="3600" dirty="0" smtClean="0"/>
-              <a:t>Transverse processes were manually located on ground-truth CTs</a:t>
-            </a:r>
-            <a:r>
-              <a:rPr lang="en-US" sz="3600" dirty="0" smtClean="0"/>
-              <a:t>.</a:t>
+              <a:t>Transverse processes were manually located on ground-truth CTs.</a:t>
             </a:r>
           </a:p>
           <a:p>
@@ -5107,11 +5109,7 @@
             </a:pPr>
             <a:r>
               <a:rPr lang="en-CA" sz="3600" dirty="0" smtClean="0"/>
-              <a:t>The model </a:t>
-            </a:r>
-            <a:r>
-              <a:rPr lang="en-CA" sz="3600" dirty="0" smtClean="0"/>
-              <a:t>was </a:t>
+              <a:t>The model was </a:t>
             </a:r>
             <a:r>
               <a:rPr lang="en-CA" sz="3600" dirty="0"/>
@@ -5127,11 +5125,7 @@
             </a:r>
             <a:r>
               <a:rPr lang="en-CA" sz="3600" dirty="0" smtClean="0"/>
-              <a:t>to ground-truth </a:t>
-            </a:r>
-            <a:r>
-              <a:rPr lang="en-CA" sz="3600" dirty="0" smtClean="0"/>
-              <a:t>segmentations.</a:t>
+              <a:t>to ground-truth segmentations.</a:t>
             </a:r>
             <a:endParaRPr lang="en-CA" sz="3600" dirty="0"/>
           </a:p>
@@ -5243,7 +5237,11 @@
             </a:pPr>
             <a:r>
               <a:rPr lang="en-US" sz="3200" dirty="0" smtClean="0"/>
-              <a:t>[2] </a:t>
+              <a:t>[2] An N. </a:t>
+            </a:r>
+            <a:r>
+              <a:rPr lang="en-US" sz="3200" dirty="0"/>
+              <a:t>Human spine. https://grabcad.com/library/human-spine-1</a:t>
             </a:r>
             <a:endParaRPr lang="en-CA" sz="3200" dirty="0"/>
           </a:p>
@@ -5258,9 +5256,9 @@
         <p:grpSpPr>
           <a:xfrm>
             <a:off x="369385" y="4061923"/>
-            <a:ext cx="15930158" cy="10344796"/>
+            <a:ext cx="15923671" cy="10344796"/>
             <a:chOff x="357598" y="4061920"/>
-            <a:chExt cx="15930158" cy="10842180"/>
+            <a:chExt cx="15923671" cy="10842180"/>
           </a:xfrm>
           <a:solidFill>
             <a:srgbClr val="9A0E2C"/>
@@ -5277,7 +5275,7 @@
           <p:spPr bwMode="auto">
             <a:xfrm>
               <a:off x="357598" y="4061920"/>
-              <a:ext cx="15928521" cy="10842179"/>
+              <a:ext cx="15923671" cy="10842179"/>
             </a:xfrm>
             <a:prstGeom prst="rect">
               <a:avLst/>
@@ -5321,8 +5319,8 @@
           </p:nvSpPr>
           <p:spPr bwMode="auto">
             <a:xfrm>
-              <a:off x="689449" y="5035771"/>
-              <a:ext cx="15598307" cy="9868329"/>
+              <a:off x="689450" y="5035771"/>
+              <a:ext cx="15577944" cy="9868329"/>
             </a:xfrm>
             <a:prstGeom prst="rect">
               <a:avLst/>
@@ -5614,21 +5612,21 @@
                 <a:gridCol w="2115221">
                   <a:extLst>
                     <a:ext uri="{9D8B030D-6E8A-4147-A177-3AD203B41FA5}">
-                      <a16:colId xmlns:a16="http://schemas.microsoft.com/office/drawing/2014/main" xmlns="" val="20000"/>
+                      <a16:colId xmlns:a16="http://schemas.microsoft.com/office/drawing/2014/main" val="20000"/>
                     </a:ext>
                   </a:extLst>
                 </a:gridCol>
                 <a:gridCol w="2343284">
                   <a:extLst>
                     <a:ext uri="{9D8B030D-6E8A-4147-A177-3AD203B41FA5}">
-                      <a16:colId xmlns:a16="http://schemas.microsoft.com/office/drawing/2014/main" xmlns="" val="20001"/>
+                      <a16:colId xmlns:a16="http://schemas.microsoft.com/office/drawing/2014/main" val="20001"/>
                     </a:ext>
                   </a:extLst>
                 </a:gridCol>
                 <a:gridCol w="2351451">
                   <a:extLst>
                     <a:ext uri="{9D8B030D-6E8A-4147-A177-3AD203B41FA5}">
-                      <a16:colId xmlns:a16="http://schemas.microsoft.com/office/drawing/2014/main" xmlns="" val="20002"/>
+                      <a16:colId xmlns:a16="http://schemas.microsoft.com/office/drawing/2014/main" val="20002"/>
                     </a:ext>
                   </a:extLst>
                 </a:gridCol>
@@ -5857,7 +5855,7 @@
                 </a:tc>
                 <a:extLst>
                   <a:ext uri="{0D108BD9-81ED-4DB2-BD59-A6C34878D82A}">
-                    <a16:rowId xmlns:a16="http://schemas.microsoft.com/office/drawing/2014/main" xmlns="" val="10000"/>
+                    <a16:rowId xmlns:a16="http://schemas.microsoft.com/office/drawing/2014/main" val="10000"/>
                   </a:ext>
                 </a:extLst>
               </a:tr>
@@ -6053,7 +6051,7 @@
                 </a:tc>
                 <a:extLst>
                   <a:ext uri="{0D108BD9-81ED-4DB2-BD59-A6C34878D82A}">
-                    <a16:rowId xmlns:a16="http://schemas.microsoft.com/office/drawing/2014/main" xmlns="" val="10001"/>
+                    <a16:rowId xmlns:a16="http://schemas.microsoft.com/office/drawing/2014/main" val="10001"/>
                   </a:ext>
                 </a:extLst>
               </a:tr>
@@ -6249,7 +6247,7 @@
                 </a:tc>
                 <a:extLst>
                   <a:ext uri="{0D108BD9-81ED-4DB2-BD59-A6C34878D82A}">
-                    <a16:rowId xmlns:a16="http://schemas.microsoft.com/office/drawing/2014/main" xmlns="" val="10002"/>
+                    <a16:rowId xmlns:a16="http://schemas.microsoft.com/office/drawing/2014/main" val="10002"/>
                   </a:ext>
                 </a:extLst>
               </a:tr>
@@ -6445,7 +6443,7 @@
                 </a:tc>
                 <a:extLst>
                   <a:ext uri="{0D108BD9-81ED-4DB2-BD59-A6C34878D82A}">
-                    <a16:rowId xmlns:a16="http://schemas.microsoft.com/office/drawing/2014/main" xmlns="" val="10003"/>
+                    <a16:rowId xmlns:a16="http://schemas.microsoft.com/office/drawing/2014/main" val="10003"/>
                   </a:ext>
                 </a:extLst>
               </a:tr>
@@ -6641,7 +6639,7 @@
                 </a:tc>
                 <a:extLst>
                   <a:ext uri="{0D108BD9-81ED-4DB2-BD59-A6C34878D82A}">
-                    <a16:rowId xmlns:a16="http://schemas.microsoft.com/office/drawing/2014/main" xmlns="" val="10004"/>
+                    <a16:rowId xmlns:a16="http://schemas.microsoft.com/office/drawing/2014/main" val="10004"/>
                   </a:ext>
                 </a:extLst>
               </a:tr>
@@ -6837,7 +6835,7 @@
                 </a:tc>
                 <a:extLst>
                   <a:ext uri="{0D108BD9-81ED-4DB2-BD59-A6C34878D82A}">
-                    <a16:rowId xmlns:a16="http://schemas.microsoft.com/office/drawing/2014/main" xmlns="" val="10005"/>
+                    <a16:rowId xmlns:a16="http://schemas.microsoft.com/office/drawing/2014/main" val="10005"/>
                   </a:ext>
                 </a:extLst>
               </a:tr>
@@ -7376,7 +7374,15 @@
             </a:pPr>
             <a:r>
               <a:rPr lang="en-US" sz="3600" dirty="0" smtClean="0"/>
-              <a:t>The displacement fields were applied to the model, warping it to the patients’ anatomy.</a:t>
+              <a:t>The displacement fields were applied to the model, warping it to </a:t>
+            </a:r>
+            <a:r>
+              <a:rPr lang="en-US" sz="3600" dirty="0" smtClean="0"/>
+              <a:t>patient </a:t>
+            </a:r>
+            <a:r>
+              <a:rPr lang="en-US" sz="3600" dirty="0" smtClean="0"/>
+              <a:t>anatomy.</a:t>
             </a:r>
             <a:endParaRPr lang="en-CA" sz="3600" dirty="0"/>
           </a:p>

</xml_diff>